<commit_message>
reupload centrale bank v1
een onderdeel te veel bij A5
</commit_message>
<xml_diff>
--- a/LeilaVerbeek_0940566_Centralebank_V1.pptx
+++ b/LeilaVerbeek_0940566_Centralebank_V1.pptx
@@ -11,16 +11,15 @@
     <p:sldId id="259" r:id="rId5"/>
     <p:sldId id="260" r:id="rId6"/>
     <p:sldId id="261" r:id="rId7"/>
-    <p:sldId id="262" r:id="rId8"/>
-    <p:sldId id="263" r:id="rId9"/>
-    <p:sldId id="264" r:id="rId10"/>
-    <p:sldId id="265" r:id="rId11"/>
-    <p:sldId id="266" r:id="rId12"/>
-    <p:sldId id="268" r:id="rId13"/>
-    <p:sldId id="269" r:id="rId14"/>
-    <p:sldId id="270" r:id="rId15"/>
-    <p:sldId id="271" r:id="rId16"/>
-    <p:sldId id="272" r:id="rId17"/>
+    <p:sldId id="263" r:id="rId8"/>
+    <p:sldId id="264" r:id="rId9"/>
+    <p:sldId id="265" r:id="rId10"/>
+    <p:sldId id="266" r:id="rId11"/>
+    <p:sldId id="268" r:id="rId12"/>
+    <p:sldId id="269" r:id="rId13"/>
+    <p:sldId id="270" r:id="rId14"/>
+    <p:sldId id="271" r:id="rId15"/>
+    <p:sldId id="272" r:id="rId16"/>
   </p:sldIdLst>
   <p:sldSz cx="12192000" cy="6858000"/>
   <p:notesSz cx="6858000" cy="9144000"/>
@@ -3942,7 +3941,7 @@
             </a:br>
             <a:r>
               <a:rPr lang="nl-NL" sz="2400" dirty="0"/>
-              <a:t>Functionele eisen</a:t>
+              <a:t>Niet-Functionele eisen</a:t>
             </a:r>
             <a:endParaRPr lang="nl-NL" dirty="0"/>
           </a:p>
@@ -3960,71 +3959,30 @@
         </p:nvSpPr>
         <p:spPr/>
         <p:txBody>
-          <a:bodyPr>
-            <a:normAutofit fontScale="92500" lnSpcReduction="10000"/>
-          </a:bodyPr>
+          <a:bodyPr/>
           <a:lstStyle/>
           <a:p>
-            <a:pPr fontAlgn="base"/>
             <a:r>
               <a:rPr lang="nl-NL" dirty="0"/>
-              <a:t>De geldautomaat moet  biljetten van tenminste vier verschillende waarden uit kunnen geven.</a:t>
-            </a:r>
-          </a:p>
-          <a:p>
-            <a:pPr fontAlgn="base"/>
+              <a:t>M – nette code</a:t>
+            </a:r>
+          </a:p>
+          <a:p>
             <a:r>
               <a:rPr lang="nl-NL" dirty="0"/>
-              <a:t>De gebruiker kan niet, zonder een pin-opdracht te geven, geld uit de automaat halen.</a:t>
-            </a:r>
-          </a:p>
-          <a:p>
-            <a:pPr fontAlgn="base"/>
+              <a:t>M – versie beheer</a:t>
+            </a:r>
+          </a:p>
+          <a:p>
             <a:r>
               <a:rPr lang="nl-NL" dirty="0"/>
-              <a:t>De geldautomaat geeft altijd het juiste bedrag.</a:t>
-            </a:r>
-          </a:p>
-          <a:p>
-            <a:pPr fontAlgn="base"/>
+              <a:t>M – gemakkelijk te gebruiken</a:t>
+            </a:r>
+          </a:p>
+          <a:p>
             <a:r>
               <a:rPr lang="nl-NL" dirty="0"/>
-              <a:t>De geldautomaat geeft alleen geld als het saldo toereikend is.</a:t>
-            </a:r>
-          </a:p>
-          <a:p>
-            <a:pPr fontAlgn="base"/>
-            <a:r>
-              <a:rPr lang="nl-NL" dirty="0"/>
-              <a:t>De gebruiker kan zelf selecteren welke biljetten hij/zij wil ontvangen.</a:t>
-            </a:r>
-          </a:p>
-          <a:p>
-            <a:pPr fontAlgn="base"/>
-            <a:r>
-              <a:rPr lang="nl-NL" dirty="0"/>
-              <a:t>De gebruiker kan geen biljetten kiezen die niet aanwezig zijn in de geldautomaat.</a:t>
-            </a:r>
-          </a:p>
-          <a:p>
-            <a:pPr fontAlgn="base"/>
-            <a:r>
-              <a:rPr lang="nl-NL" dirty="0"/>
-              <a:t>De geldautomaat is robuust (kan zelfstandig staan en valt niet om/uit elkaar tijdens gebruik).</a:t>
-            </a:r>
-          </a:p>
-          <a:p>
-            <a:pPr fontAlgn="base"/>
-            <a:r>
-              <a:rPr lang="nl-NL" dirty="0"/>
-              <a:t>De biljetten in de geldautomaat mogen maximaal de dikte van een speelkaart hebben.</a:t>
-            </a:r>
-          </a:p>
-          <a:p>
-            <a:pPr fontAlgn="base"/>
-            <a:r>
-              <a:rPr lang="nl-NL" dirty="0"/>
-              <a:t>Na het pinnen wordt er een bon geprint met een bonprinter. Op deze bon staat in ieder geval hoeveel geld er is opgenomen en bij welke (lokale of individuele) bank dit is gebeurd.</a:t>
+              <a:t>C - efficiënt</a:t>
             </a:r>
           </a:p>
         </p:txBody>
@@ -4032,7 +3990,7 @@
     </p:spTree>
     <p:extLst>
       <p:ext uri="{BB962C8B-B14F-4D97-AF65-F5344CB8AC3E}">
-        <p14:creationId xmlns:p14="http://schemas.microsoft.com/office/powerpoint/2010/main" val="900368221"/>
+        <p14:creationId xmlns:p14="http://schemas.microsoft.com/office/powerpoint/2010/main" val="2289515714"/>
       </p:ext>
     </p:extLst>
   </p:cSld>
@@ -4076,14 +4034,14 @@
           <a:p>
             <a:r>
               <a:rPr lang="nl-NL" dirty="0"/>
-              <a:t>Analyseren</a:t>
+              <a:t>Adviseren</a:t>
             </a:r>
             <a:br>
               <a:rPr lang="nl-NL" dirty="0"/>
             </a:br>
             <a:r>
               <a:rPr lang="nl-NL" sz="2400" dirty="0"/>
-              <a:t>Niet-Functionele eisen</a:t>
+              <a:t>Doel</a:t>
             </a:r>
             <a:endParaRPr lang="nl-NL" dirty="0"/>
           </a:p>
@@ -4106,33 +4064,24 @@
           <a:p>
             <a:r>
               <a:rPr lang="nl-NL" dirty="0"/>
-              <a:t>M – nette code</a:t>
+              <a:t>Op dit moment zijn er verschillende groepen banken. De gebruikers kunnen alleen bij banken pinnen die aangesloten zijn bij de groepsbank waar hun orginele bank ook bij aangesloten is.</a:t>
             </a:r>
           </a:p>
           <a:p>
             <a:r>
               <a:rPr lang="nl-NL" dirty="0"/>
-              <a:t>M – versie beheer</a:t>
-            </a:r>
-          </a:p>
-          <a:p>
-            <a:r>
-              <a:rPr lang="nl-NL" dirty="0"/>
-              <a:t>M – gemakkelijk te gebruiken</a:t>
-            </a:r>
-          </a:p>
-          <a:p>
-            <a:r>
-              <a:rPr lang="nl-NL" dirty="0"/>
-              <a:t>C - efficiënt</a:t>
-            </a:r>
+              <a:t>Het doel is om een manier te bedenken waarop gebruikers bij elke bank kunnen pinnen, ongeacht of deze bij dezelfde groepsbank horen of niet.</a:t>
+            </a:r>
+          </a:p>
+          <a:p>
+            <a:endParaRPr lang="nl-NL" dirty="0"/>
           </a:p>
         </p:txBody>
       </p:sp>
     </p:spTree>
     <p:extLst>
       <p:ext uri="{BB962C8B-B14F-4D97-AF65-F5344CB8AC3E}">
-        <p14:creationId xmlns:p14="http://schemas.microsoft.com/office/powerpoint/2010/main" val="2289515714"/>
+        <p14:creationId xmlns:p14="http://schemas.microsoft.com/office/powerpoint/2010/main" val="1256010561"/>
       </p:ext>
     </p:extLst>
   </p:cSld>
@@ -4183,97 +4132,6 @@
             </a:br>
             <a:r>
               <a:rPr lang="nl-NL" sz="2400" dirty="0"/>
-              <a:t>Doel</a:t>
-            </a:r>
-            <a:endParaRPr lang="nl-NL" dirty="0"/>
-          </a:p>
-        </p:txBody>
-      </p:sp>
-      <p:sp>
-        <p:nvSpPr>
-          <p:cNvPr id="3" name="Content Placeholder 2"/>
-          <p:cNvSpPr>
-            <a:spLocks noGrp="1"/>
-          </p:cNvSpPr>
-          <p:nvPr>
-            <p:ph idx="1"/>
-          </p:nvPr>
-        </p:nvSpPr>
-        <p:spPr/>
-        <p:txBody>
-          <a:bodyPr/>
-          <a:lstStyle/>
-          <a:p>
-            <a:r>
-              <a:rPr lang="nl-NL" dirty="0"/>
-              <a:t>Op dit moment zijn er verschillende groepen banken. De gebruikers kunnen alleen bij banken pinnen die aangesloten zijn bij de groepsbank waar hun orginele bank ook bij aangesloten is.</a:t>
-            </a:r>
-          </a:p>
-          <a:p>
-            <a:r>
-              <a:rPr lang="nl-NL" dirty="0"/>
-              <a:t>Het doel is om een manier te bedenken waarop gebruikers bij elke bank kunnen pinnen, ongeacht of deze bij dezelfde groepsbank horen of niet.</a:t>
-            </a:r>
-          </a:p>
-          <a:p>
-            <a:endParaRPr lang="nl-NL" dirty="0"/>
-          </a:p>
-        </p:txBody>
-      </p:sp>
-    </p:spTree>
-    <p:extLst>
-      <p:ext uri="{BB962C8B-B14F-4D97-AF65-F5344CB8AC3E}">
-        <p14:creationId xmlns:p14="http://schemas.microsoft.com/office/powerpoint/2010/main" val="1256010561"/>
-      </p:ext>
-    </p:extLst>
-  </p:cSld>
-  <p:clrMapOvr>
-    <a:masterClrMapping/>
-  </p:clrMapOvr>
-</p:sld>
-</file>
-
-<file path=ppt/slides/slide13.xml><?xml version="1.0" encoding="utf-8"?>
-<p:sld xmlns:a="http://schemas.openxmlformats.org/drawingml/2006/main" xmlns:r="http://schemas.openxmlformats.org/officeDocument/2006/relationships" xmlns:p="http://schemas.openxmlformats.org/presentationml/2006/main">
-  <p:cSld>
-    <p:spTree>
-      <p:nvGrpSpPr>
-        <p:cNvPr id="1" name=""/>
-        <p:cNvGrpSpPr/>
-        <p:nvPr/>
-      </p:nvGrpSpPr>
-      <p:grpSpPr>
-        <a:xfrm>
-          <a:off x="0" y="0"/>
-          <a:ext cx="0" cy="0"/>
-          <a:chOff x="0" y="0"/>
-          <a:chExt cx="0" cy="0"/>
-        </a:xfrm>
-      </p:grpSpPr>
-      <p:sp>
-        <p:nvSpPr>
-          <p:cNvPr id="2" name="Title 1"/>
-          <p:cNvSpPr>
-            <a:spLocks noGrp="1"/>
-          </p:cNvSpPr>
-          <p:nvPr>
-            <p:ph type="title"/>
-          </p:nvPr>
-        </p:nvSpPr>
-        <p:spPr/>
-        <p:txBody>
-          <a:bodyPr/>
-          <a:lstStyle/>
-          <a:p>
-            <a:r>
-              <a:rPr lang="nl-NL" dirty="0"/>
-              <a:t>Adviseren</a:t>
-            </a:r>
-            <a:br>
-              <a:rPr lang="nl-NL" dirty="0"/>
-            </a:br>
-            <a:r>
-              <a:rPr lang="nl-NL" sz="2400" dirty="0"/>
               <a:t>Advies</a:t>
             </a:r>
             <a:endParaRPr lang="nl-NL" dirty="0"/>
@@ -4367,7 +4225,7 @@
 </p:sld>
 </file>
 
-<file path=ppt/slides/slide14.xml><?xml version="1.0" encoding="utf-8"?>
+<file path=ppt/slides/slide13.xml><?xml version="1.0" encoding="utf-8"?>
 <p:sld xmlns:a="http://schemas.openxmlformats.org/drawingml/2006/main" xmlns:r="http://schemas.openxmlformats.org/officeDocument/2006/relationships" xmlns:p="http://schemas.openxmlformats.org/presentationml/2006/main">
   <p:cSld>
     <p:spTree>
@@ -4457,7 +4315,7 @@
 </p:sld>
 </file>
 
-<file path=ppt/slides/slide15.xml><?xml version="1.0" encoding="utf-8"?>
+<file path=ppt/slides/slide14.xml><?xml version="1.0" encoding="utf-8"?>
 <p:sld xmlns:a="http://schemas.openxmlformats.org/drawingml/2006/main" xmlns:r="http://schemas.openxmlformats.org/officeDocument/2006/relationships" xmlns:p="http://schemas.openxmlformats.org/presentationml/2006/main">
   <p:cSld>
     <p:spTree>
@@ -4546,7 +4404,7 @@
 </p:sld>
 </file>
 
-<file path=ppt/slides/slide16.xml><?xml version="1.0" encoding="utf-8"?>
+<file path=ppt/slides/slide15.xml><?xml version="1.0" encoding="utf-8"?>
 <p:sld xmlns:a="http://schemas.openxmlformats.org/drawingml/2006/main" xmlns:r="http://schemas.openxmlformats.org/officeDocument/2006/relationships" xmlns:p="http://schemas.openxmlformats.org/presentationml/2006/main">
   <p:cSld>
     <p:spTree>
@@ -4858,7 +4716,7 @@
         <p:spPr/>
         <p:txBody>
           <a:bodyPr numCol="2">
-            <a:normAutofit fontScale="92500" lnSpcReduction="10000"/>
+            <a:normAutofit/>
           </a:bodyPr>
           <a:lstStyle/>
           <a:p>
@@ -4906,13 +4764,6 @@
             <a:r>
               <a:rPr lang="nl-NL" dirty="0"/>
               <a:t>Overdraagbaarheid</a:t>
-            </a:r>
-          </a:p>
-          <a:p>
-            <a:pPr lvl="2"/>
-            <a:r>
-              <a:rPr lang="nl-NL" dirty="0"/>
-              <a:t>Maakbaarheid</a:t>
             </a:r>
           </a:p>
           <a:p>
@@ -8739,9 +8590,8 @@
             </a:br>
             <a:r>
               <a:rPr lang="nl-NL" sz="2400" dirty="0"/>
-              <a:t>Kwaliteitseisen eindresultaat						maakbaarheid</a:t>
-            </a:r>
-            <a:endParaRPr lang="nl-NL" dirty="0"/>
+              <a:t>Kwaliteitseisen gebruik eindresultaat			bruikbaarheid</a:t>
+            </a:r>
           </a:p>
         </p:txBody>
       </p:sp>
@@ -8762,27 +8612,30 @@
           <a:p>
             <a:r>
               <a:rPr lang="nl-NL" dirty="0"/>
-              <a:t>Maakbaarheid betekend dat het product daadwerkelijk gerealiseerd moet kunnen worden.</a:t>
+              <a:t>Het systeem moet bruikbaar zijn voor de gebruiker.</a:t>
             </a:r>
           </a:p>
           <a:p>
             <a:r>
               <a:rPr lang="nl-NL" dirty="0"/>
-              <a:t>Om het systeem maakbaar te krijgen, moet goed gekeken worden naar de tijd die men heeft om het systeem te realiseren.</a:t>
+              <a:t>Dit kan je realiseren door het systeem makkelijk te maken voor de eindgebruiker. Om hier achter te komen kun je een aantal gebruikers het systeem laten testen, omdat je als programmeur al snel vindt dat iets duidelijk is, wat buitenstaanders misschien niet vinden.</a:t>
             </a:r>
           </a:p>
           <a:p>
             <a:r>
               <a:rPr lang="nl-NL" dirty="0"/>
-              <a:t>Vanuit hier ga je kijken naar de eisen van het systeem en de mogelijkheden die er zijn om deze eisen te realiseren. Je kan niet altijd voor de makkelijkste en snelste manier gaan, want dit is meestal niet te beste optie. Wel kun je de mogelijkheden tegenover elkaar zetten en kijken wat er met tijd, budget en mankracht haalbaar is.</a:t>
-            </a:r>
+              <a:t>Ook moet je er voor zorgen dat er niet te veel moeilijke vaktermen gebruikt worden.</a:t>
+            </a:r>
+          </a:p>
+          <a:p>
+            <a:endParaRPr lang="nl-NL" dirty="0"/>
           </a:p>
         </p:txBody>
       </p:sp>
     </p:spTree>
     <p:extLst>
       <p:ext uri="{BB962C8B-B14F-4D97-AF65-F5344CB8AC3E}">
-        <p14:creationId xmlns:p14="http://schemas.microsoft.com/office/powerpoint/2010/main" val="3930566763"/>
+        <p14:creationId xmlns:p14="http://schemas.microsoft.com/office/powerpoint/2010/main" val="492088091"/>
       </p:ext>
     </p:extLst>
   </p:cSld>
@@ -8821,7 +8674,9 @@
         </p:nvSpPr>
         <p:spPr/>
         <p:txBody>
-          <a:bodyPr/>
+          <a:bodyPr>
+            <a:normAutofit/>
+          </a:bodyPr>
           <a:lstStyle/>
           <a:p>
             <a:r>
@@ -8833,7 +8688,7 @@
             </a:br>
             <a:r>
               <a:rPr lang="nl-NL" sz="2400" dirty="0"/>
-              <a:t>Kwaliteitseisen gebruik eindresultaat			bruikbaarheid</a:t>
+              <a:t>Kwaliteitseisen gebruik eindresultaat			Effectiviteit</a:t>
             </a:r>
           </a:p>
         </p:txBody>
@@ -8855,30 +8710,27 @@
           <a:p>
             <a:r>
               <a:rPr lang="nl-NL" dirty="0"/>
-              <a:t>Het systeem moet bruikbaar zijn voor de gebruiker.</a:t>
+              <a:t>Het syteem moet effectief zijn, in dat het de gestelde doelen moet bereiken.</a:t>
             </a:r>
           </a:p>
           <a:p>
             <a:r>
               <a:rPr lang="nl-NL" dirty="0"/>
-              <a:t>Dit kan je realiseren door het systeem makkelijk te maken voor de eindgebruiker. Om hier achter te komen kun je een aantal gebruikers het systeem laten testen, omdat je als programmeur al snel vindt dat iets duidelijk is, wat buitenstaanders misschien niet vinden.</a:t>
+              <a:t>Om dit voor elkaar te krijgen moeten de eisen en het process goed bewaakt worden. Het is al snel mogelijk dat je iets over het hoofd ziet.</a:t>
             </a:r>
           </a:p>
           <a:p>
             <a:r>
               <a:rPr lang="nl-NL" dirty="0"/>
-              <a:t>Ook moet je er voor zorgen dat er niet te veel moeilijke vaktermen gebruikt worden.</a:t>
-            </a:r>
-          </a:p>
-          <a:p>
-            <a:endParaRPr lang="nl-NL" dirty="0"/>
+              <a:t>Dit kun je bereiken door in stappen te werken en te monitoren wat je allemaal al bereikt hebt.</a:t>
+            </a:r>
           </a:p>
         </p:txBody>
       </p:sp>
     </p:spTree>
     <p:extLst>
       <p:ext uri="{BB962C8B-B14F-4D97-AF65-F5344CB8AC3E}">
-        <p14:creationId xmlns:p14="http://schemas.microsoft.com/office/powerpoint/2010/main" val="492088091"/>
+        <p14:creationId xmlns:p14="http://schemas.microsoft.com/office/powerpoint/2010/main" val="3707029487"/>
       </p:ext>
     </p:extLst>
   </p:cSld>
@@ -8917,9 +8769,7 @@
         </p:nvSpPr>
         <p:spPr/>
         <p:txBody>
-          <a:bodyPr>
-            <a:normAutofit/>
-          </a:bodyPr>
+          <a:bodyPr/>
           <a:lstStyle/>
           <a:p>
             <a:r>
@@ -8931,8 +8781,9 @@
             </a:br>
             <a:r>
               <a:rPr lang="nl-NL" sz="2400" dirty="0"/>
-              <a:t>Kwaliteitseisen gebruik eindresultaat			Effectiviteit</a:t>
-            </a:r>
+              <a:t>Functionele eisen</a:t>
+            </a:r>
+            <a:endParaRPr lang="nl-NL" dirty="0"/>
           </a:p>
         </p:txBody>
       </p:sp>
@@ -8948,24 +8799,71 @@
         </p:nvSpPr>
         <p:spPr/>
         <p:txBody>
-          <a:bodyPr/>
+          <a:bodyPr>
+            <a:normAutofit fontScale="92500" lnSpcReduction="10000"/>
+          </a:bodyPr>
           <a:lstStyle/>
           <a:p>
+            <a:pPr fontAlgn="base"/>
             <a:r>
               <a:rPr lang="nl-NL" dirty="0"/>
-              <a:t>Het syteem moet effectief zijn, in dat het de gestelde doelen moet bereiken.</a:t>
-            </a:r>
-          </a:p>
-          <a:p>
+              <a:t>De geldautomaat moet  biljetten van tenminste vier verschillende waarden uit kunnen geven.</a:t>
+            </a:r>
+          </a:p>
+          <a:p>
+            <a:pPr fontAlgn="base"/>
             <a:r>
               <a:rPr lang="nl-NL" dirty="0"/>
-              <a:t>Om dit voor elkaar te krijgen moeten de eisen en het process goed bewaakt worden. Het is al snel mogelijk dat je iets over het hoofd ziet.</a:t>
-            </a:r>
-          </a:p>
-          <a:p>
+              <a:t>De gebruiker kan niet, zonder een pin-opdracht te geven, geld uit de automaat halen.</a:t>
+            </a:r>
+          </a:p>
+          <a:p>
+            <a:pPr fontAlgn="base"/>
             <a:r>
               <a:rPr lang="nl-NL" dirty="0"/>
-              <a:t>Dit kun je bereiken door in stappen te werken en te monitoren wat je allemaal al bereikt hebt.</a:t>
+              <a:t>De geldautomaat geeft altijd het juiste bedrag.</a:t>
+            </a:r>
+          </a:p>
+          <a:p>
+            <a:pPr fontAlgn="base"/>
+            <a:r>
+              <a:rPr lang="nl-NL" dirty="0"/>
+              <a:t>De geldautomaat geeft alleen geld als het saldo toereikend is.</a:t>
+            </a:r>
+          </a:p>
+          <a:p>
+            <a:pPr fontAlgn="base"/>
+            <a:r>
+              <a:rPr lang="nl-NL" dirty="0"/>
+              <a:t>De gebruiker kan zelf selecteren welke biljetten hij/zij wil ontvangen.</a:t>
+            </a:r>
+          </a:p>
+          <a:p>
+            <a:pPr fontAlgn="base"/>
+            <a:r>
+              <a:rPr lang="nl-NL" dirty="0"/>
+              <a:t>De gebruiker kan geen biljetten kiezen die niet aanwezig zijn in de geldautomaat.</a:t>
+            </a:r>
+          </a:p>
+          <a:p>
+            <a:pPr fontAlgn="base"/>
+            <a:r>
+              <a:rPr lang="nl-NL" dirty="0"/>
+              <a:t>De geldautomaat is robuust (kan zelfstandig staan en valt niet om/uit elkaar tijdens gebruik).</a:t>
+            </a:r>
+          </a:p>
+          <a:p>
+            <a:pPr fontAlgn="base"/>
+            <a:r>
+              <a:rPr lang="nl-NL" dirty="0"/>
+              <a:t>De biljetten in de geldautomaat mogen maximaal de dikte van een speelkaart hebben.</a:t>
+            </a:r>
+          </a:p>
+          <a:p>
+            <a:pPr fontAlgn="base"/>
+            <a:r>
+              <a:rPr lang="nl-NL" dirty="0"/>
+              <a:t>Na het pinnen wordt er een bon geprint met een bonprinter. Op deze bon staat in ieder geval hoeveel geld er is opgenomen en bij welke (lokale of individuele) bank dit is gebeurd.</a:t>
             </a:r>
           </a:p>
         </p:txBody>
@@ -8973,7 +8871,7 @@
     </p:spTree>
     <p:extLst>
       <p:ext uri="{BB962C8B-B14F-4D97-AF65-F5344CB8AC3E}">
-        <p14:creationId xmlns:p14="http://schemas.microsoft.com/office/powerpoint/2010/main" val="3707029487"/>
+        <p14:creationId xmlns:p14="http://schemas.microsoft.com/office/powerpoint/2010/main" val="900368221"/>
       </p:ext>
     </p:extLst>
   </p:cSld>

</xml_diff>

<commit_message>
Aanpassing kolommen bronnen en inhoud ivm classroom bug
</commit_message>
<xml_diff>
--- a/LeilaVerbeek_0940566_Centralebank_V1.pptx
+++ b/LeilaVerbeek_0940566_Centralebank_V1.pptx
@@ -4450,13 +4450,13 @@
             <a:spLocks noGrp="1"/>
           </p:cNvSpPr>
           <p:nvPr>
-            <p:ph idx="1"/>
+            <p:ph sz="half" idx="1"/>
           </p:nvPr>
         </p:nvSpPr>
         <p:spPr/>
         <p:txBody>
-          <a:bodyPr numCol="2">
-            <a:normAutofit fontScale="70000" lnSpcReduction="20000"/>
+          <a:bodyPr numCol="1">
+            <a:normAutofit fontScale="62500" lnSpcReduction="20000"/>
           </a:bodyPr>
           <a:lstStyle/>
           <a:p>
@@ -4550,6 +4550,33 @@
             <a:endParaRPr lang="nl-NL" sz="1800" dirty="0"/>
           </a:p>
           <a:p>
+            <a:endParaRPr lang="nl-NL" dirty="0"/>
+          </a:p>
+        </p:txBody>
+      </p:sp>
+      <p:sp>
+        <p:nvSpPr>
+          <p:cNvPr id="4" name="Tijdelijke aanduiding voor inhoud 3">
+            <a:extLst>
+              <a:ext uri="{FF2B5EF4-FFF2-40B4-BE49-F238E27FC236}">
+                <a16:creationId xmlns:a16="http://schemas.microsoft.com/office/drawing/2014/main" id="{FEC126BA-A0D5-4802-98F3-C4430EAC3782}"/>
+              </a:ext>
+            </a:extLst>
+          </p:cNvPr>
+          <p:cNvSpPr>
+            <a:spLocks noGrp="1"/>
+          </p:cNvSpPr>
+          <p:nvPr>
+            <p:ph sz="half" idx="2"/>
+          </p:nvPr>
+        </p:nvSpPr>
+        <p:spPr/>
+        <p:txBody>
+          <a:bodyPr>
+            <a:normAutofit fontScale="62500" lnSpcReduction="20000"/>
+          </a:bodyPr>
+          <a:lstStyle/>
+          <a:p>
             <a:r>
               <a:rPr lang="nl-NL" sz="2100" dirty="0"/>
               <a:t>Coderen</a:t>
@@ -4647,7 +4674,7 @@
             </a:r>
           </a:p>
           <a:p>
-            <a:endParaRPr lang="nl-NL" dirty="0"/>
+            <a:endParaRPr lang="en-GB" dirty="0"/>
           </a:p>
         </p:txBody>
       </p:sp>
@@ -4710,84 +4737,121 @@
             <a:spLocks noGrp="1"/>
           </p:cNvSpPr>
           <p:nvPr>
-            <p:ph idx="1"/>
+            <p:ph sz="half" idx="1"/>
+          </p:nvPr>
+        </p:nvSpPr>
+        <p:spPr>
+          <a:xfrm>
+            <a:off x="441493" y="2228003"/>
+            <a:ext cx="5422390" cy="3633047"/>
+          </a:xfrm>
+        </p:spPr>
+        <p:txBody>
+          <a:bodyPr numCol="1">
+            <a:normAutofit lnSpcReduction="10000"/>
+          </a:bodyPr>
+          <a:lstStyle/>
+          <a:p>
+            <a:r>
+              <a:rPr lang="nl-NL" dirty="0"/>
+              <a:t>Beheren</a:t>
+            </a:r>
+          </a:p>
+          <a:p>
+            <a:pPr lvl="1"/>
+            <a:r>
+              <a:rPr lang="nl-NL" dirty="0"/>
+              <a:t>Risicolog</a:t>
+            </a:r>
+          </a:p>
+          <a:p>
+            <a:pPr lvl="1"/>
+            <a:r>
+              <a:rPr lang="nl-NL" dirty="0"/>
+              <a:t>Issue tracking log</a:t>
+            </a:r>
+          </a:p>
+          <a:p>
+            <a:r>
+              <a:rPr lang="nl-NL" dirty="0"/>
+              <a:t>Analyseren</a:t>
+            </a:r>
+          </a:p>
+          <a:p>
+            <a:pPr lvl="1"/>
+            <a:r>
+              <a:rPr lang="nl-NL" dirty="0"/>
+              <a:t>Kwaliteitseisen eindresultaat</a:t>
+            </a:r>
+          </a:p>
+          <a:p>
+            <a:pPr lvl="2"/>
+            <a:r>
+              <a:rPr lang="nl-NL" dirty="0"/>
+              <a:t>Security</a:t>
+            </a:r>
+          </a:p>
+          <a:p>
+            <a:pPr lvl="2"/>
+            <a:r>
+              <a:rPr lang="nl-NL" dirty="0"/>
+              <a:t>Overdraagbaarheid</a:t>
+            </a:r>
+          </a:p>
+          <a:p>
+            <a:pPr lvl="1"/>
+            <a:r>
+              <a:rPr lang="nl-NL" dirty="0"/>
+              <a:t>Kwaliteitseisen gebruik eindresultaat</a:t>
+            </a:r>
+          </a:p>
+          <a:p>
+            <a:pPr lvl="2"/>
+            <a:r>
+              <a:rPr lang="nl-NL" dirty="0"/>
+              <a:t>Bruikbaarheid</a:t>
+            </a:r>
+          </a:p>
+          <a:p>
+            <a:pPr lvl="2"/>
+            <a:r>
+              <a:rPr lang="nl-NL" dirty="0"/>
+              <a:t>Effectiviteit</a:t>
+            </a:r>
+          </a:p>
+          <a:p>
+            <a:pPr lvl="2"/>
+            <a:endParaRPr lang="nl-NL" dirty="0"/>
+          </a:p>
+          <a:p>
+            <a:pPr lvl="1"/>
+            <a:endParaRPr lang="nl-NL" dirty="0"/>
+          </a:p>
+        </p:txBody>
+      </p:sp>
+      <p:sp>
+        <p:nvSpPr>
+          <p:cNvPr id="4" name="Tijdelijke aanduiding voor inhoud 3">
+            <a:extLst>
+              <a:ext uri="{FF2B5EF4-FFF2-40B4-BE49-F238E27FC236}">
+                <a16:creationId xmlns:a16="http://schemas.microsoft.com/office/drawing/2014/main" id="{11CAD72B-30CA-45CC-BDB2-B8577F5ACE83}"/>
+              </a:ext>
+            </a:extLst>
+          </p:cNvPr>
+          <p:cNvSpPr>
+            <a:spLocks noGrp="1"/>
+          </p:cNvSpPr>
+          <p:nvPr>
+            <p:ph sz="half" idx="2"/>
           </p:nvPr>
         </p:nvSpPr>
         <p:spPr/>
         <p:txBody>
-          <a:bodyPr numCol="2">
-            <a:normAutofit/>
+          <a:bodyPr>
+            <a:normAutofit lnSpcReduction="10000"/>
           </a:bodyPr>
           <a:lstStyle/>
           <a:p>
-            <a:r>
-              <a:rPr lang="nl-NL" dirty="0"/>
-              <a:t>Beheren</a:t>
-            </a:r>
-          </a:p>
-          <a:p>
-            <a:pPr lvl="1"/>
-            <a:r>
-              <a:rPr lang="nl-NL" dirty="0"/>
-              <a:t>Risicolog</a:t>
-            </a:r>
-          </a:p>
-          <a:p>
-            <a:pPr lvl="1"/>
-            <a:r>
-              <a:rPr lang="nl-NL" dirty="0"/>
-              <a:t>Issue tracking log</a:t>
-            </a:r>
-          </a:p>
-          <a:p>
-            <a:r>
-              <a:rPr lang="nl-NL" dirty="0"/>
-              <a:t>Analyseren</a:t>
-            </a:r>
-          </a:p>
-          <a:p>
-            <a:pPr lvl="1"/>
-            <a:r>
-              <a:rPr lang="nl-NL" dirty="0"/>
-              <a:t>Kwaliteitseisen eindresultaat</a:t>
-            </a:r>
-          </a:p>
-          <a:p>
-            <a:pPr lvl="2"/>
-            <a:r>
-              <a:rPr lang="nl-NL" dirty="0"/>
-              <a:t>Security</a:t>
-            </a:r>
-          </a:p>
-          <a:p>
-            <a:pPr lvl="2"/>
-            <a:r>
-              <a:rPr lang="nl-NL" dirty="0"/>
-              <a:t>Overdraagbaarheid</a:t>
-            </a:r>
-          </a:p>
-          <a:p>
-            <a:pPr lvl="1"/>
-            <a:r>
-              <a:rPr lang="nl-NL" dirty="0"/>
-              <a:t>Kwaliteitseisen gebruik eindresultaat</a:t>
-            </a:r>
-          </a:p>
-          <a:p>
-            <a:pPr lvl="2"/>
-            <a:r>
-              <a:rPr lang="nl-NL" dirty="0"/>
-              <a:t>Bruikbaarheid</a:t>
-            </a:r>
-          </a:p>
-          <a:p>
-            <a:pPr lvl="2"/>
-            <a:r>
-              <a:rPr lang="nl-NL" dirty="0"/>
-              <a:t>Effectiviteit</a:t>
-            </a:r>
-          </a:p>
-          <a:p>
             <a:pPr lvl="1"/>
             <a:r>
               <a:rPr lang="nl-NL" dirty="0"/>
@@ -4849,8 +4913,7 @@
             </a:r>
           </a:p>
           <a:p>
-            <a:pPr lvl="1"/>
-            <a:endParaRPr lang="nl-NL" dirty="0"/>
+            <a:endParaRPr lang="en-GB" dirty="0"/>
           </a:p>
         </p:txBody>
       </p:sp>

</xml_diff>